<commit_message>
migracion base de datos
</commit_message>
<xml_diff>
--- a/Rubilar_presentacion2.pptx
+++ b/Rubilar_presentacion2.pptx
@@ -14977,7 +14977,7 @@
           </a:ln>
           <a:extLst>
             <a:ext uri="{91240B29-F687-4f45-9708-019B960494DF}">
-              <a14:hiddenLine xmlns="" xmlns:a14="http://schemas.microsoft.com/office/drawing/2010/main" w="9525">
+              <a14:hiddenLine xmlns:a14="http://schemas.microsoft.com/office/drawing/2010/main" xmlns="" w="9525">
                 <a:solidFill>
                   <a:srgbClr val="000000"/>
                 </a:solidFill>
@@ -15370,7 +15370,7 @@
           </a:ln>
           <a:extLst>
             <a:ext uri="{91240B29-F687-4f45-9708-019B960494DF}">
-              <a14:hiddenLine xmlns="" xmlns:a14="http://schemas.microsoft.com/office/drawing/2010/main" w="9525">
+              <a14:hiddenLine xmlns:a14="http://schemas.microsoft.com/office/drawing/2010/main" xmlns="" w="9525">
                 <a:solidFill>
                   <a:srgbClr val="000000"/>
                 </a:solidFill>
@@ -15414,7 +15414,7 @@
           </a:ln>
           <a:extLst>
             <a:ext uri="{91240B29-F687-4f45-9708-019B960494DF}">
-              <a14:hiddenLine xmlns="" xmlns:a14="http://schemas.microsoft.com/office/drawing/2010/main" w="9525">
+              <a14:hiddenLine xmlns:a14="http://schemas.microsoft.com/office/drawing/2010/main" xmlns="" w="9525">
                 <a:solidFill>
                   <a:srgbClr val="000000"/>
                 </a:solidFill>
@@ -15608,7 +15608,7 @@
           </a:ln>
           <a:extLst>
             <a:ext uri="{91240B29-F687-4f45-9708-019B960494DF}">
-              <a14:hiddenLine xmlns="" xmlns:a14="http://schemas.microsoft.com/office/drawing/2010/main" w="9525">
+              <a14:hiddenLine xmlns:a14="http://schemas.microsoft.com/office/drawing/2010/main" xmlns="" w="9525">
                 <a:solidFill>
                   <a:srgbClr val="000000"/>
                 </a:solidFill>
@@ -15652,7 +15652,7 @@
           </a:ln>
           <a:extLst>
             <a:ext uri="{91240B29-F687-4f45-9708-019B960494DF}">
-              <a14:hiddenLine xmlns="" xmlns:a14="http://schemas.microsoft.com/office/drawing/2010/main" w="9525">
+              <a14:hiddenLine xmlns:a14="http://schemas.microsoft.com/office/drawing/2010/main" xmlns="" w="9525">
                 <a:solidFill>
                   <a:srgbClr val="000000"/>
                 </a:solidFill>
@@ -15823,7 +15823,7 @@
           </a:ln>
           <a:extLst>
             <a:ext uri="{91240B29-F687-4f45-9708-019B960494DF}">
-              <a14:hiddenLine xmlns="" xmlns:a14="http://schemas.microsoft.com/office/drawing/2010/main" w="9525">
+              <a14:hiddenLine xmlns:a14="http://schemas.microsoft.com/office/drawing/2010/main" xmlns="" w="9525">
                 <a:solidFill>
                   <a:srgbClr val="000000"/>
                 </a:solidFill>
@@ -15867,7 +15867,7 @@
           </a:ln>
           <a:extLst>
             <a:ext uri="{91240B29-F687-4f45-9708-019B960494DF}">
-              <a14:hiddenLine xmlns="" xmlns:a14="http://schemas.microsoft.com/office/drawing/2010/main" w="9525">
+              <a14:hiddenLine xmlns:a14="http://schemas.microsoft.com/office/drawing/2010/main" xmlns="" w="9525">
                 <a:solidFill>
                   <a:srgbClr val="000000"/>
                 </a:solidFill>
@@ -15911,7 +15911,7 @@
           </a:ln>
           <a:extLst>
             <a:ext uri="{91240B29-F687-4f45-9708-019B960494DF}">
-              <a14:hiddenLine xmlns="" xmlns:a14="http://schemas.microsoft.com/office/drawing/2010/main" w="9525">
+              <a14:hiddenLine xmlns:a14="http://schemas.microsoft.com/office/drawing/2010/main" xmlns="" w="9525">
                 <a:solidFill>
                   <a:srgbClr val="000000"/>
                 </a:solidFill>
@@ -16594,7 +16594,7 @@
           </a:ln>
           <a:extLst>
             <a:ext uri="{91240B29-F687-4f45-9708-019B960494DF}">
-              <a14:hiddenLine xmlns="" xmlns:a14="http://schemas.microsoft.com/office/drawing/2010/main" w="9525">
+              <a14:hiddenLine xmlns:a14="http://schemas.microsoft.com/office/drawing/2010/main" xmlns="" w="9525">
                 <a:solidFill>
                   <a:srgbClr val="000000"/>
                 </a:solidFill>
@@ -16638,7 +16638,7 @@
           </a:ln>
           <a:extLst>
             <a:ext uri="{91240B29-F687-4f45-9708-019B960494DF}">
-              <a14:hiddenLine xmlns="" xmlns:a14="http://schemas.microsoft.com/office/drawing/2010/main" w="9525">
+              <a14:hiddenLine xmlns:a14="http://schemas.microsoft.com/office/drawing/2010/main" xmlns="" w="9525">
                 <a:solidFill>
                   <a:srgbClr val="000000"/>
                 </a:solidFill>
@@ -16735,7 +16735,7 @@
           </a:ln>
           <a:extLst>
             <a:ext uri="{91240B29-F687-4f45-9708-019B960494DF}">
-              <a14:hiddenLine xmlns="" xmlns:a14="http://schemas.microsoft.com/office/drawing/2010/main" w="9525">
+              <a14:hiddenLine xmlns:a14="http://schemas.microsoft.com/office/drawing/2010/main" xmlns="" w="9525">
                 <a:solidFill>
                   <a:srgbClr val="000000"/>
                 </a:solidFill>
@@ -16779,7 +16779,7 @@
           </a:ln>
           <a:extLst>
             <a:ext uri="{91240B29-F687-4f45-9708-019B960494DF}">
-              <a14:hiddenLine xmlns="" xmlns:a14="http://schemas.microsoft.com/office/drawing/2010/main" w="9525">
+              <a14:hiddenLine xmlns:a14="http://schemas.microsoft.com/office/drawing/2010/main" xmlns="" w="9525">
                 <a:solidFill>
                   <a:srgbClr val="000000"/>
                 </a:solidFill>
@@ -17270,14 +17270,14 @@
           </a:ln>
           <a:extLst>
             <a:ext uri="{909E8E84-426E-40dd-AFC4-6F175D3DCCD1}">
-              <a14:hiddenFill xmlns="" xmlns:a14="http://schemas.microsoft.com/office/drawing/2010/main">
+              <a14:hiddenFill xmlns:a14="http://schemas.microsoft.com/office/drawing/2010/main" xmlns="">
                 <a:solidFill>
                   <a:srgbClr val="FFFFFF"/>
                 </a:solidFill>
               </a14:hiddenFill>
             </a:ext>
             <a:ext uri="{91240B29-F687-4f45-9708-019B960494DF}">
-              <a14:hiddenLine xmlns="" xmlns:a14="http://schemas.microsoft.com/office/drawing/2010/main" w="9525">
+              <a14:hiddenLine xmlns:a14="http://schemas.microsoft.com/office/drawing/2010/main" xmlns="" w="9525">
                 <a:solidFill>
                   <a:srgbClr val="000000"/>
                 </a:solidFill>
@@ -17287,7 +17287,7 @@
               </a14:hiddenLine>
             </a:ext>
             <a:ext uri="{FAA26D3D-D897-4be2-8F04-BA451C77F1D7}">
-              <ma14:placeholderFlag xmlns="" xmlns:ma14="http://schemas.microsoft.com/office/mac/drawingml/2011/main" val="1"/>
+              <ma14:placeholderFlag xmlns:ma14="http://schemas.microsoft.com/office/mac/drawingml/2011/main" xmlns="" val="1"/>
             </a:ext>
           </a:extLst>
         </p:spPr>
@@ -17331,14 +17331,14 @@
           </a:ln>
           <a:extLst>
             <a:ext uri="{909E8E84-426E-40dd-AFC4-6F175D3DCCD1}">
-              <a14:hiddenFill xmlns="" xmlns:a14="http://schemas.microsoft.com/office/drawing/2010/main">
+              <a14:hiddenFill xmlns:a14="http://schemas.microsoft.com/office/drawing/2010/main" xmlns="">
                 <a:solidFill>
                   <a:srgbClr val="FFFFFF"/>
                 </a:solidFill>
               </a14:hiddenFill>
             </a:ext>
             <a:ext uri="{91240B29-F687-4f45-9708-019B960494DF}">
-              <a14:hiddenLine xmlns="" xmlns:a14="http://schemas.microsoft.com/office/drawing/2010/main" w="9525">
+              <a14:hiddenLine xmlns:a14="http://schemas.microsoft.com/office/drawing/2010/main" xmlns="" w="9525">
                 <a:solidFill>
                   <a:srgbClr val="000000"/>
                 </a:solidFill>
@@ -17348,7 +17348,7 @@
               </a14:hiddenLine>
             </a:ext>
             <a:ext uri="{FAA26D3D-D897-4be2-8F04-BA451C77F1D7}">
-              <ma14:placeholderFlag xmlns="" xmlns:ma14="http://schemas.microsoft.com/office/mac/drawingml/2011/main" val="1"/>
+              <ma14:placeholderFlag xmlns:ma14="http://schemas.microsoft.com/office/mac/drawingml/2011/main" xmlns="" val="1"/>
             </a:ext>
           </a:extLst>
         </p:spPr>
@@ -17919,14 +17919,14 @@
           <a:ln/>
           <a:extLst>
             <a:ext uri="{909E8E84-426E-40dd-AFC4-6F175D3DCCD1}">
-              <a14:hiddenFill xmlns="" xmlns:a14="http://schemas.microsoft.com/office/drawing/2010/main">
+              <a14:hiddenFill xmlns:a14="http://schemas.microsoft.com/office/drawing/2010/main" xmlns="">
                 <a:solidFill>
                   <a:srgbClr val="FFFFFF"/>
                 </a:solidFill>
               </a14:hiddenFill>
             </a:ext>
             <a:ext uri="{91240B29-F687-4f45-9708-019B960494DF}">
-              <a14:hiddenLine xmlns="" xmlns:a14="http://schemas.microsoft.com/office/drawing/2010/main" w="9525">
+              <a14:hiddenLine xmlns:a14="http://schemas.microsoft.com/office/drawing/2010/main" xmlns="" w="9525">
                 <a:solidFill>
                   <a:srgbClr val="000000"/>
                 </a:solidFill>
@@ -18387,14 +18387,14 @@
           <a:ln/>
           <a:extLst>
             <a:ext uri="{909E8E84-426E-40dd-AFC4-6F175D3DCCD1}">
-              <a14:hiddenFill xmlns="" xmlns:a14="http://schemas.microsoft.com/office/drawing/2010/main">
+              <a14:hiddenFill xmlns:a14="http://schemas.microsoft.com/office/drawing/2010/main" xmlns="">
                 <a:solidFill>
                   <a:srgbClr val="FFFFFF"/>
                 </a:solidFill>
               </a14:hiddenFill>
             </a:ext>
             <a:ext uri="{91240B29-F687-4f45-9708-019B960494DF}">
-              <a14:hiddenLine xmlns="" xmlns:a14="http://schemas.microsoft.com/office/drawing/2010/main" w="9525">
+              <a14:hiddenLine xmlns:a14="http://schemas.microsoft.com/office/drawing/2010/main" xmlns="" w="9525">
                 <a:solidFill>
                   <a:srgbClr val="000000"/>
                 </a:solidFill>
@@ -18676,14 +18676,14 @@
           <a:ln/>
           <a:extLst>
             <a:ext uri="{909E8E84-426E-40dd-AFC4-6F175D3DCCD1}">
-              <a14:hiddenFill xmlns="" xmlns:a14="http://schemas.microsoft.com/office/drawing/2010/main">
+              <a14:hiddenFill xmlns:a14="http://schemas.microsoft.com/office/drawing/2010/main" xmlns="">
                 <a:solidFill>
                   <a:srgbClr val="FFFFFF"/>
                 </a:solidFill>
               </a14:hiddenFill>
             </a:ext>
             <a:ext uri="{91240B29-F687-4f45-9708-019B960494DF}">
-              <a14:hiddenLine xmlns="" xmlns:a14="http://schemas.microsoft.com/office/drawing/2010/main" w="9525">
+              <a14:hiddenLine xmlns:a14="http://schemas.microsoft.com/office/drawing/2010/main" xmlns="" w="9525">
                 <a:solidFill>
                   <a:srgbClr val="000000"/>
                 </a:solidFill>
@@ -20602,14 +20602,14 @@
           </a:ln>
           <a:extLst>
             <a:ext uri="{909E8E84-426E-40dd-AFC4-6F175D3DCCD1}">
-              <a14:hiddenFill xmlns="" xmlns:a14="http://schemas.microsoft.com/office/drawing/2010/main">
+              <a14:hiddenFill xmlns:a14="http://schemas.microsoft.com/office/drawing/2010/main" xmlns="">
                 <a:solidFill>
                   <a:srgbClr val="FFFFFF"/>
                 </a:solidFill>
               </a14:hiddenFill>
             </a:ext>
             <a:ext uri="{91240B29-F687-4f45-9708-019B960494DF}">
-              <a14:hiddenLine xmlns="" xmlns:a14="http://schemas.microsoft.com/office/drawing/2010/main" w="9525">
+              <a14:hiddenLine xmlns:a14="http://schemas.microsoft.com/office/drawing/2010/main" xmlns="" w="9525">
                 <a:solidFill>
                   <a:srgbClr val="000000"/>
                 </a:solidFill>
@@ -20619,7 +20619,7 @@
               </a14:hiddenLine>
             </a:ext>
             <a:ext uri="{FAA26D3D-D897-4be2-8F04-BA451C77F1D7}">
-              <ma14:placeholderFlag xmlns="" xmlns:ma14="http://schemas.microsoft.com/office/mac/drawingml/2011/main" val="1"/>
+              <ma14:placeholderFlag xmlns:ma14="http://schemas.microsoft.com/office/mac/drawingml/2011/main" xmlns="" val="1"/>
             </a:ext>
           </a:extLst>
         </p:spPr>
@@ -20803,14 +20803,14 @@
           <a:ln/>
           <a:extLst>
             <a:ext uri="{909E8E84-426E-40dd-AFC4-6F175D3DCCD1}">
-              <a14:hiddenFill xmlns="" xmlns:a14="http://schemas.microsoft.com/office/drawing/2010/main">
+              <a14:hiddenFill xmlns:a14="http://schemas.microsoft.com/office/drawing/2010/main" xmlns="">
                 <a:solidFill>
                   <a:srgbClr val="FFFFFF"/>
                 </a:solidFill>
               </a14:hiddenFill>
             </a:ext>
             <a:ext uri="{91240B29-F687-4f45-9708-019B960494DF}">
-              <a14:hiddenLine xmlns="" xmlns:a14="http://schemas.microsoft.com/office/drawing/2010/main" w="9525">
+              <a14:hiddenLine xmlns:a14="http://schemas.microsoft.com/office/drawing/2010/main" xmlns="" w="9525">
                 <a:solidFill>
                   <a:srgbClr val="000000"/>
                 </a:solidFill>
@@ -21268,14 +21268,14 @@
           <a:ln/>
           <a:extLst>
             <a:ext uri="{909E8E84-426E-40dd-AFC4-6F175D3DCCD1}">
-              <a14:hiddenFill xmlns="" xmlns:a14="http://schemas.microsoft.com/office/drawing/2010/main">
+              <a14:hiddenFill xmlns:a14="http://schemas.microsoft.com/office/drawing/2010/main" xmlns="">
                 <a:solidFill>
                   <a:srgbClr val="FFFFFF"/>
                 </a:solidFill>
               </a14:hiddenFill>
             </a:ext>
             <a:ext uri="{91240B29-F687-4f45-9708-019B960494DF}">
-              <a14:hiddenLine xmlns="" xmlns:a14="http://schemas.microsoft.com/office/drawing/2010/main" w="9525">
+              <a14:hiddenLine xmlns:a14="http://schemas.microsoft.com/office/drawing/2010/main" xmlns="" w="9525">
                 <a:solidFill>
                   <a:srgbClr val="000000"/>
                 </a:solidFill>
@@ -21535,14 +21535,14 @@
           <a:ln/>
           <a:extLst>
             <a:ext uri="{909E8E84-426E-40dd-AFC4-6F175D3DCCD1}">
-              <a14:hiddenFill xmlns="" xmlns:a14="http://schemas.microsoft.com/office/drawing/2010/main">
+              <a14:hiddenFill xmlns:a14="http://schemas.microsoft.com/office/drawing/2010/main" xmlns="">
                 <a:solidFill>
                   <a:srgbClr val="FFFFFF"/>
                 </a:solidFill>
               </a14:hiddenFill>
             </a:ext>
             <a:ext uri="{91240B29-F687-4f45-9708-019B960494DF}">
-              <a14:hiddenLine xmlns="" xmlns:a14="http://schemas.microsoft.com/office/drawing/2010/main" w="9525">
+              <a14:hiddenLine xmlns:a14="http://schemas.microsoft.com/office/drawing/2010/main" xmlns="" w="9525">
                 <a:solidFill>
                   <a:srgbClr val="000000"/>
                 </a:solidFill>
@@ -21757,14 +21757,14 @@
           <a:ln/>
           <a:extLst>
             <a:ext uri="{909E8E84-426E-40dd-AFC4-6F175D3DCCD1}">
-              <a14:hiddenFill xmlns="" xmlns:a14="http://schemas.microsoft.com/office/drawing/2010/main">
+              <a14:hiddenFill xmlns:a14="http://schemas.microsoft.com/office/drawing/2010/main" xmlns="">
                 <a:solidFill>
                   <a:srgbClr val="FFFFFF"/>
                 </a:solidFill>
               </a14:hiddenFill>
             </a:ext>
             <a:ext uri="{91240B29-F687-4f45-9708-019B960494DF}">
-              <a14:hiddenLine xmlns="" xmlns:a14="http://schemas.microsoft.com/office/drawing/2010/main" w="9525">
+              <a14:hiddenLine xmlns:a14="http://schemas.microsoft.com/office/drawing/2010/main" xmlns="" w="9525">
                 <a:solidFill>
                   <a:srgbClr val="000000"/>
                 </a:solidFill>
@@ -22496,14 +22496,14 @@
           <a:ln/>
           <a:extLst>
             <a:ext uri="{909E8E84-426E-40dd-AFC4-6F175D3DCCD1}">
-              <a14:hiddenFill xmlns="" xmlns:a14="http://schemas.microsoft.com/office/drawing/2010/main">
+              <a14:hiddenFill xmlns:a14="http://schemas.microsoft.com/office/drawing/2010/main" xmlns="">
                 <a:solidFill>
                   <a:srgbClr val="FFFFFF"/>
                 </a:solidFill>
               </a14:hiddenFill>
             </a:ext>
             <a:ext uri="{91240B29-F687-4f45-9708-019B960494DF}">
-              <a14:hiddenLine xmlns="" xmlns:a14="http://schemas.microsoft.com/office/drawing/2010/main" w="9525">
+              <a14:hiddenLine xmlns:a14="http://schemas.microsoft.com/office/drawing/2010/main" xmlns="" w="9525">
                 <a:solidFill>
                   <a:srgbClr val="000000"/>
                 </a:solidFill>

</xml_diff>